<commit_message>
Update IMPLEMENTATION MATTERS IN DEEP POLICY.pptx
</commit_message>
<xml_diff>
--- a/2020/09/IMPLEMENTATION MATTERS IN DEEP POLICY.pptx
+++ b/2020/09/IMPLEMENTATION MATTERS IN DEEP POLICY.pptx
@@ -12,6 +12,7 @@
     <p:sldId id="260" r:id="rId6"/>
     <p:sldId id="261" r:id="rId7"/>
     <p:sldId id="262" r:id="rId8"/>
+    <p:sldId id="263" r:id="rId9"/>
   </p:sldIdLst>
   <p:sldSz cx="12192000" cy="6858000"/>
   <p:notesSz cx="6858000" cy="9144000"/>
@@ -3941,7 +3942,7 @@
                 <p:ph idx="1"/>
                 <p:extLst>
                   <p:ext uri="{D42A27DB-BD31-4B8C-83A1-F6EECF244321}">
-                    <p14:modId xmlns:p14="http://schemas.microsoft.com/office/powerpoint/2010/main" val="3796556395"/>
+                    <p14:modId xmlns:p14="http://schemas.microsoft.com/office/powerpoint/2010/main" val="2386471431"/>
                   </p:ext>
                 </p:extLst>
               </p:nvPr>
@@ -4262,10 +4263,9 @@
                         <a:lstStyle/>
                         <a:p>
                           <a:r>
-                            <a:rPr lang="en-US"/>
-                            <a:t>Bellman equations</a:t>
+                            <a:rPr lang="en-US" dirty="0"/>
+                            <a:t>Gradient Descent of Bellman equations</a:t>
                           </a:r>
-                          <a:endParaRPr lang="en-US" dirty="0"/>
                         </a:p>
                       </a:txBody>
                       <a:tcPr/>
@@ -4328,7 +4328,7 @@
                 <p:ph idx="1"/>
                 <p:extLst>
                   <p:ext uri="{D42A27DB-BD31-4B8C-83A1-F6EECF244321}">
-                    <p14:modId xmlns:p14="http://schemas.microsoft.com/office/powerpoint/2010/main" val="3796556395"/>
+                    <p14:modId xmlns:p14="http://schemas.microsoft.com/office/powerpoint/2010/main" val="2386471431"/>
                   </p:ext>
                 </p:extLst>
               </p:nvPr>
@@ -4534,10 +4534,9 @@
                         <a:lstStyle/>
                         <a:p>
                           <a:r>
-                            <a:rPr lang="en-US"/>
-                            <a:t>Bellman equations</a:t>
+                            <a:rPr lang="en-US" dirty="0"/>
+                            <a:t>Gradient Descent of Bellman equations</a:t>
                           </a:r>
-                          <a:endParaRPr lang="en-US" dirty="0"/>
                         </a:p>
                       </a:txBody>
                       <a:tcPr/>
@@ -4778,56 +4777,6 @@
           </a:prstGeom>
         </p:spPr>
       </p:pic>
-      <p:sp>
-        <p:nvSpPr>
-          <p:cNvPr id="6" name="TextBox 5">
-            <a:extLst>
-              <a:ext uri="{FF2B5EF4-FFF2-40B4-BE49-F238E27FC236}">
-                <a16:creationId xmlns:a16="http://schemas.microsoft.com/office/drawing/2014/main" id="{342D89E2-17A2-48DD-9D3C-C55EF1426339}"/>
-              </a:ext>
-            </a:extLst>
-          </p:cNvPr>
-          <p:cNvSpPr txBox="1"/>
-          <p:nvPr/>
-        </p:nvSpPr>
-        <p:spPr>
-          <a:xfrm>
-            <a:off x="6762750" y="4362450"/>
-            <a:ext cx="3809456" cy="369332"/>
-          </a:xfrm>
-          <a:prstGeom prst="rect">
-            <a:avLst/>
-          </a:prstGeom>
-        </p:spPr>
-        <p:style>
-          <a:lnRef idx="2">
-            <a:schemeClr val="accent2">
-              <a:shade val="50000"/>
-            </a:schemeClr>
-          </a:lnRef>
-          <a:fillRef idx="1">
-            <a:schemeClr val="accent2"/>
-          </a:fillRef>
-          <a:effectRef idx="0">
-            <a:schemeClr val="accent2"/>
-          </a:effectRef>
-          <a:fontRef idx="minor">
-            <a:schemeClr val="lt1"/>
-          </a:fontRef>
-        </p:style>
-        <p:txBody>
-          <a:bodyPr wrap="square" rtlCol="0">
-            <a:spAutoFit/>
-          </a:bodyPr>
-          <a:lstStyle/>
-          <a:p>
-            <a:r>
-              <a:rPr lang="en-US" dirty="0"/>
-              <a:t>https://arxiv.org/pdf/1707.06347.pdf</a:t>
-            </a:r>
-          </a:p>
-        </p:txBody>
-      </p:sp>
     </p:spTree>
     <p:extLst>
       <p:ext uri="{BB962C8B-B14F-4D97-AF65-F5344CB8AC3E}">
@@ -7583,6 +7532,388 @@
     <p:extLst>
       <p:ext uri="{BB962C8B-B14F-4D97-AF65-F5344CB8AC3E}">
         <p14:creationId xmlns:p14="http://schemas.microsoft.com/office/powerpoint/2010/main" val="625668231"/>
+      </p:ext>
+    </p:extLst>
+  </p:cSld>
+  <p:clrMapOvr>
+    <a:masterClrMapping/>
+  </p:clrMapOvr>
+</p:sld>
+</file>
+
+<file path=ppt/slides/slide8.xml><?xml version="1.0" encoding="utf-8"?>
+<p:sld xmlns:a="http://schemas.openxmlformats.org/drawingml/2006/main" xmlns:r="http://schemas.openxmlformats.org/officeDocument/2006/relationships" xmlns:p="http://schemas.openxmlformats.org/presentationml/2006/main">
+  <p:cSld>
+    <p:spTree>
+      <p:nvGrpSpPr>
+        <p:cNvPr id="1" name=""/>
+        <p:cNvGrpSpPr/>
+        <p:nvPr/>
+      </p:nvGrpSpPr>
+      <p:grpSpPr>
+        <a:xfrm>
+          <a:off x="0" y="0"/>
+          <a:ext cx="0" cy="0"/>
+          <a:chOff x="0" y="0"/>
+          <a:chExt cx="0" cy="0"/>
+        </a:xfrm>
+      </p:grpSpPr>
+      <p:sp>
+        <p:nvSpPr>
+          <p:cNvPr id="2" name="Title 1">
+            <a:extLst>
+              <a:ext uri="{FF2B5EF4-FFF2-40B4-BE49-F238E27FC236}">
+                <a16:creationId xmlns:a16="http://schemas.microsoft.com/office/drawing/2014/main" id="{DF965827-6181-404F-B879-2E431AB2ADDF}"/>
+              </a:ext>
+            </a:extLst>
+          </p:cNvPr>
+          <p:cNvSpPr>
+            <a:spLocks noGrp="1"/>
+          </p:cNvSpPr>
+          <p:nvPr>
+            <p:ph type="title"/>
+          </p:nvPr>
+        </p:nvSpPr>
+        <p:spPr/>
+        <p:txBody>
+          <a:bodyPr/>
+          <a:lstStyle/>
+          <a:p>
+            <a:r>
+              <a:rPr lang="en-US" dirty="0"/>
+              <a:t>Resources</a:t>
+            </a:r>
+          </a:p>
+        </p:txBody>
+      </p:sp>
+      <p:graphicFrame>
+        <p:nvGraphicFramePr>
+          <p:cNvPr id="4" name="Table 4">
+            <a:extLst>
+              <a:ext uri="{FF2B5EF4-FFF2-40B4-BE49-F238E27FC236}">
+                <a16:creationId xmlns:a16="http://schemas.microsoft.com/office/drawing/2014/main" id="{D9F8C804-7802-45AF-8110-5AE4451289B6}"/>
+              </a:ext>
+            </a:extLst>
+          </p:cNvPr>
+          <p:cNvGraphicFramePr>
+            <a:graphicFrameLocks noGrp="1"/>
+          </p:cNvGraphicFramePr>
+          <p:nvPr>
+            <p:ph idx="1"/>
+            <p:extLst>
+              <p:ext uri="{D42A27DB-BD31-4B8C-83A1-F6EECF244321}">
+                <p14:modId xmlns:p14="http://schemas.microsoft.com/office/powerpoint/2010/main" val="4137231576"/>
+              </p:ext>
+            </p:extLst>
+          </p:nvPr>
+        </p:nvGraphicFramePr>
+        <p:xfrm>
+          <a:off x="838200" y="1009650"/>
+          <a:ext cx="10809751" cy="2595880"/>
+        </p:xfrm>
+        <a:graphic>
+          <a:graphicData uri="http://schemas.openxmlformats.org/drawingml/2006/table">
+            <a:tbl>
+              <a:tblPr firstRow="1" bandRow="1">
+                <a:tableStyleId>{5C22544A-7EE6-4342-B048-85BDC9FD1C3A}</a:tableStyleId>
+              </a:tblPr>
+              <a:tblGrid>
+                <a:gridCol w="2258695">
+                  <a:extLst>
+                    <a:ext uri="{9D8B030D-6E8A-4147-A177-3AD203B41FA5}">
+                      <a16:colId xmlns:a16="http://schemas.microsoft.com/office/drawing/2014/main" val="3998922135"/>
+                    </a:ext>
+                  </a:extLst>
+                </a:gridCol>
+                <a:gridCol w="8551056">
+                  <a:extLst>
+                    <a:ext uri="{9D8B030D-6E8A-4147-A177-3AD203B41FA5}">
+                      <a16:colId xmlns:a16="http://schemas.microsoft.com/office/drawing/2014/main" val="3004856061"/>
+                    </a:ext>
+                  </a:extLst>
+                </a:gridCol>
+              </a:tblGrid>
+              <a:tr h="370840">
+                <a:tc>
+                  <a:txBody>
+                    <a:bodyPr/>
+                    <a:lstStyle/>
+                    <a:p>
+                      <a:r>
+                        <a:rPr lang="en-US" dirty="0"/>
+                        <a:t>Reference</a:t>
+                      </a:r>
+                    </a:p>
+                  </a:txBody>
+                  <a:tcPr/>
+                </a:tc>
+                <a:tc>
+                  <a:txBody>
+                    <a:bodyPr/>
+                    <a:lstStyle/>
+                    <a:p>
+                      <a:r>
+                        <a:rPr lang="en-US" dirty="0"/>
+                        <a:t>Link</a:t>
+                      </a:r>
+                    </a:p>
+                  </a:txBody>
+                  <a:tcPr/>
+                </a:tc>
+                <a:extLst>
+                  <a:ext uri="{0D108BD9-81ED-4DB2-BD59-A6C34878D82A}">
+                    <a16:rowId xmlns:a16="http://schemas.microsoft.com/office/drawing/2014/main" val="3345398178"/>
+                  </a:ext>
+                </a:extLst>
+              </a:tr>
+              <a:tr h="370840">
+                <a:tc>
+                  <a:txBody>
+                    <a:bodyPr/>
+                    <a:lstStyle/>
+                    <a:p>
+                      <a:r>
+                        <a:rPr lang="en-US" dirty="0"/>
+                        <a:t>TRPO Paper</a:t>
+                      </a:r>
+                    </a:p>
+                  </a:txBody>
+                  <a:tcPr/>
+                </a:tc>
+                <a:tc>
+                  <a:txBody>
+                    <a:bodyPr/>
+                    <a:lstStyle/>
+                    <a:p>
+                      <a:r>
+                        <a:rPr lang="en-US" dirty="0">
+                          <a:hlinkClick r:id="rId2"/>
+                        </a:rPr>
+                        <a:t>Trust Region Policy Optimization, Schulman et al. 2015</a:t>
+                      </a:r>
+                      <a:endParaRPr lang="en-US" dirty="0"/>
+                    </a:p>
+                  </a:txBody>
+                  <a:tcPr/>
+                </a:tc>
+                <a:extLst>
+                  <a:ext uri="{0D108BD9-81ED-4DB2-BD59-A6C34878D82A}">
+                    <a16:rowId xmlns:a16="http://schemas.microsoft.com/office/drawing/2014/main" val="548860169"/>
+                  </a:ext>
+                </a:extLst>
+              </a:tr>
+              <a:tr h="370840">
+                <a:tc>
+                  <a:txBody>
+                    <a:bodyPr/>
+                    <a:lstStyle/>
+                    <a:p>
+                      <a:r>
+                        <a:rPr lang="en-US" dirty="0"/>
+                        <a:t>PPO Paper</a:t>
+                      </a:r>
+                    </a:p>
+                  </a:txBody>
+                  <a:tcPr/>
+                </a:tc>
+                <a:tc>
+                  <a:txBody>
+                    <a:bodyPr/>
+                    <a:lstStyle/>
+                    <a:p>
+                      <a:r>
+                        <a:rPr lang="en-US" dirty="0">
+                          <a:hlinkClick r:id="rId3"/>
+                        </a:rPr>
+                        <a:t>Proximal Policy Optimization Algorithms, Schulman et al. 2017</a:t>
+                      </a:r>
+                      <a:endParaRPr lang="en-US" dirty="0"/>
+                    </a:p>
+                  </a:txBody>
+                  <a:tcPr/>
+                </a:tc>
+                <a:extLst>
+                  <a:ext uri="{0D108BD9-81ED-4DB2-BD59-A6C34878D82A}">
+                    <a16:rowId xmlns:a16="http://schemas.microsoft.com/office/drawing/2014/main" val="1059176099"/>
+                  </a:ext>
+                </a:extLst>
+              </a:tr>
+              <a:tr h="370840">
+                <a:tc>
+                  <a:txBody>
+                    <a:bodyPr/>
+                    <a:lstStyle/>
+                    <a:p>
+                      <a:r>
+                        <a:rPr lang="en-US" dirty="0"/>
+                        <a:t>Implantation Paper</a:t>
+                      </a:r>
+                    </a:p>
+                  </a:txBody>
+                  <a:tcPr/>
+                </a:tc>
+                <a:tc>
+                  <a:txBody>
+                    <a:bodyPr/>
+                    <a:lstStyle/>
+                    <a:p>
+                      <a:r>
+                        <a:rPr lang="en-US" dirty="0">
+                          <a:hlinkClick r:id="rId4"/>
+                        </a:rPr>
+                        <a:t>Implementation Matters in Deep RL 2019</a:t>
+                      </a:r>
+                      <a:endParaRPr lang="en-US" dirty="0"/>
+                    </a:p>
+                  </a:txBody>
+                  <a:tcPr/>
+                </a:tc>
+                <a:extLst>
+                  <a:ext uri="{0D108BD9-81ED-4DB2-BD59-A6C34878D82A}">
+                    <a16:rowId xmlns:a16="http://schemas.microsoft.com/office/drawing/2014/main" val="3328668846"/>
+                  </a:ext>
+                </a:extLst>
+              </a:tr>
+              <a:tr h="370840">
+                <a:tc>
+                  <a:txBody>
+                    <a:bodyPr/>
+                    <a:lstStyle/>
+                    <a:p>
+                      <a:r>
+                        <a:rPr lang="en-US" dirty="0"/>
+                        <a:t>TRPO Overview</a:t>
+                      </a:r>
+                    </a:p>
+                  </a:txBody>
+                  <a:tcPr/>
+                </a:tc>
+                <a:tc>
+                  <a:txBody>
+                    <a:bodyPr/>
+                    <a:lstStyle/>
+                    <a:p>
+                      <a:r>
+                        <a:rPr lang="en-US" dirty="0">
+                          <a:hlinkClick r:id="rId5"/>
+                        </a:rPr>
+                        <a:t>Trust Region Policy Optimization (</a:t>
+                      </a:r>
+                      <a:r>
+                        <a:rPr lang="en-US" dirty="0" err="1">
+                          <a:hlinkClick r:id="rId5"/>
+                        </a:rPr>
+                        <a:t>OpenAI</a:t>
+                      </a:r>
+                      <a:r>
+                        <a:rPr lang="en-US" dirty="0">
+                          <a:hlinkClick r:id="rId5"/>
+                        </a:rPr>
+                        <a:t>)</a:t>
+                      </a:r>
+                      <a:endParaRPr lang="en-US" dirty="0"/>
+                    </a:p>
+                  </a:txBody>
+                  <a:tcPr/>
+                </a:tc>
+                <a:extLst>
+                  <a:ext uri="{0D108BD9-81ED-4DB2-BD59-A6C34878D82A}">
+                    <a16:rowId xmlns:a16="http://schemas.microsoft.com/office/drawing/2014/main" val="3882340030"/>
+                  </a:ext>
+                </a:extLst>
+              </a:tr>
+              <a:tr h="370840">
+                <a:tc>
+                  <a:txBody>
+                    <a:bodyPr/>
+                    <a:lstStyle/>
+                    <a:p>
+                      <a:r>
+                        <a:rPr lang="en-US" dirty="0"/>
+                        <a:t>PPO Overview</a:t>
+                      </a:r>
+                    </a:p>
+                  </a:txBody>
+                  <a:tcPr/>
+                </a:tc>
+                <a:tc>
+                  <a:txBody>
+                    <a:bodyPr/>
+                    <a:lstStyle/>
+                    <a:p>
+                      <a:r>
+                        <a:rPr lang="en-US" dirty="0">
+                          <a:hlinkClick r:id="rId6"/>
+                        </a:rPr>
+                        <a:t>Proximal Policy Optimization (</a:t>
+                      </a:r>
+                      <a:r>
+                        <a:rPr lang="en-US" dirty="0" err="1">
+                          <a:hlinkClick r:id="rId6"/>
+                        </a:rPr>
+                        <a:t>OpenAI</a:t>
+                      </a:r>
+                      <a:r>
+                        <a:rPr lang="en-US" dirty="0">
+                          <a:hlinkClick r:id="rId6"/>
+                        </a:rPr>
+                        <a:t>)</a:t>
+                      </a:r>
+                      <a:endParaRPr lang="en-US" dirty="0"/>
+                    </a:p>
+                  </a:txBody>
+                  <a:tcPr/>
+                </a:tc>
+                <a:extLst>
+                  <a:ext uri="{0D108BD9-81ED-4DB2-BD59-A6C34878D82A}">
+                    <a16:rowId xmlns:a16="http://schemas.microsoft.com/office/drawing/2014/main" val="141091608"/>
+                  </a:ext>
+                </a:extLst>
+              </a:tr>
+              <a:tr h="370840">
+                <a:tc>
+                  <a:txBody>
+                    <a:bodyPr/>
+                    <a:lstStyle/>
+                    <a:p>
+                      <a:r>
+                        <a:rPr lang="en-US" dirty="0"/>
+                        <a:t>Implementation Code</a:t>
+                      </a:r>
+                    </a:p>
+                  </a:txBody>
+                  <a:tcPr/>
+                </a:tc>
+                <a:tc>
+                  <a:txBody>
+                    <a:bodyPr/>
+                    <a:lstStyle/>
+                    <a:p>
+                      <a:r>
+                        <a:rPr lang="en-US" dirty="0">
+                          <a:hlinkClick r:id="rId7"/>
+                        </a:rPr>
+                        <a:t>https://github.com/implementation-matters/code-for-paper</a:t>
+                      </a:r>
+                      <a:endParaRPr lang="en-US" dirty="0"/>
+                    </a:p>
+                  </a:txBody>
+                  <a:tcPr/>
+                </a:tc>
+                <a:extLst>
+                  <a:ext uri="{0D108BD9-81ED-4DB2-BD59-A6C34878D82A}">
+                    <a16:rowId xmlns:a16="http://schemas.microsoft.com/office/drawing/2014/main" val="1187549830"/>
+                  </a:ext>
+                </a:extLst>
+              </a:tr>
+            </a:tbl>
+          </a:graphicData>
+        </a:graphic>
+      </p:graphicFrame>
+    </p:spTree>
+    <p:extLst>
+      <p:ext uri="{BB962C8B-B14F-4D97-AF65-F5344CB8AC3E}">
+        <p14:creationId xmlns:p14="http://schemas.microsoft.com/office/powerpoint/2010/main" val="2187744678"/>
       </p:ext>
     </p:extLst>
   </p:cSld>

</xml_diff>